<commit_message>
added slides and updated readme
</commit_message>
<xml_diff>
--- a/_Group 1 Final Project Presentation - UFO Sightings in Arizona.pptx
+++ b/_Group 1 Final Project Presentation - UFO Sightings in Arizona.pptx
@@ -5,55 +5,65 @@
     <p:sldMasterId id="2147483669" r:id="rId1"/>
   </p:sldMasterIdLst>
   <p:notesMasterIdLst>
-    <p:notesMasterId r:id="rId7"/>
+    <p:notesMasterId r:id="rId17"/>
   </p:notesMasterIdLst>
   <p:sldIdLst>
     <p:sldId id="256" r:id="rId2"/>
-    <p:sldId id="257" r:id="rId3"/>
-    <p:sldId id="258" r:id="rId4"/>
-    <p:sldId id="259" r:id="rId5"/>
-    <p:sldId id="260" r:id="rId6"/>
+    <p:sldId id="261" r:id="rId3"/>
+    <p:sldId id="257" r:id="rId4"/>
+    <p:sldId id="258" r:id="rId5"/>
+    <p:sldId id="266" r:id="rId6"/>
+    <p:sldId id="259" r:id="rId7"/>
+    <p:sldId id="260" r:id="rId8"/>
+    <p:sldId id="263" r:id="rId9"/>
+    <p:sldId id="262" r:id="rId10"/>
+    <p:sldId id="264" r:id="rId11"/>
+    <p:sldId id="265" r:id="rId12"/>
+    <p:sldId id="267" r:id="rId13"/>
+    <p:sldId id="268" r:id="rId14"/>
+    <p:sldId id="269" r:id="rId15"/>
+    <p:sldId id="270" r:id="rId16"/>
   </p:sldIdLst>
   <p:sldSz cx="9144000" cy="5143500" type="screen16x9"/>
   <p:notesSz cx="6858000" cy="9144000"/>
   <p:embeddedFontLst>
     <p:embeddedFont>
       <p:font typeface="Advent Pro SemiBold" panose="02000506040000020004" pitchFamily="2" charset="77"/>
-      <p:regular r:id="rId8"/>
-      <p:bold r:id="rId9"/>
+      <p:regular r:id="rId18"/>
+      <p:bold r:id="rId19"/>
     </p:embeddedFont>
     <p:embeddedFont>
       <p:font typeface="Fira Sans Condensed Medium" panose="020F0502020204030204" pitchFamily="34" charset="0"/>
-      <p:regular r:id="rId10"/>
-      <p:bold r:id="rId11"/>
-      <p:italic r:id="rId12"/>
-      <p:boldItalic r:id="rId13"/>
+      <p:regular r:id="rId20"/>
+      <p:bold r:id="rId21"/>
+      <p:italic r:id="rId22"/>
+      <p:boldItalic r:id="rId23"/>
     </p:embeddedFont>
     <p:embeddedFont>
       <p:font typeface="Fira Sans Extra Condensed Medium" panose="020B0603050000020004" pitchFamily="34" charset="0"/>
-      <p:regular r:id="rId14"/>
-      <p:bold r:id="rId15"/>
-      <p:italic r:id="rId16"/>
-      <p:boldItalic r:id="rId17"/>
+      <p:regular r:id="rId24"/>
+      <p:bold r:id="rId25"/>
+      <p:italic r:id="rId26"/>
+      <p:boldItalic r:id="rId27"/>
     </p:embeddedFont>
     <p:embeddedFont>
       <p:font typeface="Livvic Light" panose="020F0302020204030204" pitchFamily="34" charset="0"/>
-      <p:regular r:id="rId18"/>
-      <p:italic r:id="rId19"/>
+      <p:regular r:id="rId28"/>
+      <p:italic r:id="rId29"/>
     </p:embeddedFont>
     <p:embeddedFont>
       <p:font typeface="Maven Pro" pitchFamily="2" charset="77"/>
-      <p:regular r:id="rId20"/>
-      <p:bold r:id="rId21"/>
+      <p:regular r:id="rId30"/>
+      <p:bold r:id="rId31"/>
     </p:embeddedFont>
     <p:embeddedFont>
       <p:font typeface="Nunito Light" panose="020F0302020204030204" pitchFamily="34" charset="0"/>
-      <p:regular r:id="rId22"/>
-      <p:italic r:id="rId23"/>
+      <p:regular r:id="rId32"/>
+      <p:italic r:id="rId33"/>
     </p:embeddedFont>
     <p:embeddedFont>
       <p:font typeface="Share Tech" pitchFamily="2" charset="77"/>
-      <p:regular r:id="rId24"/>
+      <p:regular r:id="rId34"/>
     </p:embeddedFont>
   </p:embeddedFontLst>
   <p:defaultTextStyle>
@@ -774,8 +784,8 @@
         </p:nvSpPr>
         <p:spPr>
           <a:xfrm>
-            <a:off x="381300" y="685800"/>
-            <a:ext cx="6096075" cy="3429000"/>
+            <a:off x="381000" y="685800"/>
+            <a:ext cx="6096000" cy="3429000"/>
           </a:xfrm>
           <a:custGeom>
             <a:avLst/>
@@ -38458,7 +38468,7 @@
         <p:spPr>
           <a:xfrm>
             <a:off x="1307500" y="751900"/>
-            <a:ext cx="6672300" cy="2052600"/>
+            <a:ext cx="6672300" cy="912594"/>
           </a:xfrm>
           <a:prstGeom prst="rect">
             <a:avLst/>
@@ -38480,10 +38490,10 @@
               <a:buNone/>
             </a:pPr>
             <a:r>
-              <a:rPr lang="en"/>
+              <a:rPr lang="en" dirty="0"/>
               <a:t>UFO Sightings in Arizona</a:t>
             </a:r>
-            <a:endParaRPr/>
+            <a:endParaRPr dirty="0"/>
           </a:p>
         </p:txBody>
       </p:sp>
@@ -38499,7 +38509,7 @@
         </p:nvSpPr>
         <p:spPr>
           <a:xfrm>
-            <a:off x="2924250" y="2804488"/>
+            <a:off x="2924250" y="3995300"/>
             <a:ext cx="3295500" cy="792600"/>
           </a:xfrm>
           <a:prstGeom prst="rect">
@@ -38522,10 +38532,10 @@
               <a:buNone/>
             </a:pPr>
             <a:r>
-              <a:rPr lang="en"/>
+              <a:rPr lang="en" dirty="0"/>
               <a:t>Group 1 Final Project</a:t>
             </a:r>
-            <a:endParaRPr/>
+            <a:endParaRPr dirty="0"/>
           </a:p>
           <a:p>
             <a:pPr marL="0" lvl="0" indent="0" algn="ctr" rtl="0">
@@ -38537,10 +38547,40 @@
               </a:spcAft>
               <a:buNone/>
             </a:pPr>
-            <a:endParaRPr/>
+            <a:endParaRPr dirty="0"/>
           </a:p>
         </p:txBody>
       </p:sp>
+      <p:pic>
+        <p:nvPicPr>
+          <p:cNvPr id="3" name="Picture 2">
+            <a:extLst>
+              <a:ext uri="{FF2B5EF4-FFF2-40B4-BE49-F238E27FC236}">
+                <a16:creationId xmlns:a16="http://schemas.microsoft.com/office/drawing/2014/main" id="{1E7AD798-90A6-F878-D336-323B29089CC8}"/>
+              </a:ext>
+            </a:extLst>
+          </p:cNvPr>
+          <p:cNvPicPr>
+            <a:picLocks noChangeAspect="1"/>
+          </p:cNvPicPr>
+          <p:nvPr/>
+        </p:nvPicPr>
+        <p:blipFill>
+          <a:blip r:embed="rId3"/>
+          <a:stretch>
+            <a:fillRect/>
+          </a:stretch>
+        </p:blipFill>
+        <p:spPr>
+          <a:xfrm>
+            <a:off x="2622550" y="1733331"/>
+            <a:ext cx="3898900" cy="2193131"/>
+          </a:xfrm>
+          <a:prstGeom prst="rect">
+            <a:avLst/>
+          </a:prstGeom>
+        </p:spPr>
+      </p:pic>
     </p:spTree>
   </p:cSld>
   <p:clrMapOvr>
@@ -38549,7 +38589,769 @@
 </p:sld>
 </file>
 
+<file path=ppt/slides/slide10.xml><?xml version="1.0" encoding="utf-8"?>
+<p:sld xmlns:a="http://schemas.openxmlformats.org/drawingml/2006/main" xmlns:r="http://schemas.openxmlformats.org/officeDocument/2006/relationships" xmlns:p="http://schemas.openxmlformats.org/presentationml/2006/main">
+  <p:cSld>
+    <p:spTree>
+      <p:nvGrpSpPr>
+        <p:cNvPr id="1" name=""/>
+        <p:cNvGrpSpPr/>
+        <p:nvPr/>
+      </p:nvGrpSpPr>
+      <p:grpSpPr>
+        <a:xfrm>
+          <a:off x="0" y="0"/>
+          <a:ext cx="0" cy="0"/>
+          <a:chOff x="0" y="0"/>
+          <a:chExt cx="0" cy="0"/>
+        </a:xfrm>
+      </p:grpSpPr>
+      <p:sp>
+        <p:nvSpPr>
+          <p:cNvPr id="2" name="Text Placeholder 1">
+            <a:extLst>
+              <a:ext uri="{FF2B5EF4-FFF2-40B4-BE49-F238E27FC236}">
+                <a16:creationId xmlns:a16="http://schemas.microsoft.com/office/drawing/2014/main" id="{DE4BE27B-7508-1876-FCA0-1355DE3BCF1D}"/>
+              </a:ext>
+            </a:extLst>
+          </p:cNvPr>
+          <p:cNvSpPr>
+            <a:spLocks noGrp="1"/>
+          </p:cNvSpPr>
+          <p:nvPr>
+            <p:ph type="body" idx="1"/>
+          </p:nvPr>
+        </p:nvSpPr>
+        <p:spPr>
+          <a:xfrm>
+            <a:off x="6392742" y="993112"/>
+            <a:ext cx="2336482" cy="3493163"/>
+          </a:xfrm>
+        </p:spPr>
+        <p:txBody>
+          <a:bodyPr/>
+          <a:lstStyle/>
+          <a:p>
+            <a:endParaRPr lang="en-US" dirty="0"/>
+          </a:p>
+        </p:txBody>
+      </p:sp>
+      <p:sp>
+        <p:nvSpPr>
+          <p:cNvPr id="3" name="Title 2">
+            <a:extLst>
+              <a:ext uri="{FF2B5EF4-FFF2-40B4-BE49-F238E27FC236}">
+                <a16:creationId xmlns:a16="http://schemas.microsoft.com/office/drawing/2014/main" id="{B19BCDAD-19A7-D232-8314-E7DA3C49A6BF}"/>
+              </a:ext>
+            </a:extLst>
+          </p:cNvPr>
+          <p:cNvSpPr>
+            <a:spLocks noGrp="1"/>
+          </p:cNvSpPr>
+          <p:nvPr>
+            <p:ph type="ctrTitle"/>
+          </p:nvPr>
+        </p:nvSpPr>
+        <p:spPr/>
+        <p:txBody>
+          <a:bodyPr/>
+          <a:lstStyle/>
+          <a:p>
+            <a:r>
+              <a:rPr lang="en-US" dirty="0"/>
+              <a:t>SQL Database Creation - Katie</a:t>
+            </a:r>
+          </a:p>
+        </p:txBody>
+      </p:sp>
+      <p:pic>
+        <p:nvPicPr>
+          <p:cNvPr id="5" name="Picture 4">
+            <a:extLst>
+              <a:ext uri="{FF2B5EF4-FFF2-40B4-BE49-F238E27FC236}">
+                <a16:creationId xmlns:a16="http://schemas.microsoft.com/office/drawing/2014/main" id="{F69386C3-4B59-B5A4-2DAF-6AFAF63EC9F5}"/>
+              </a:ext>
+            </a:extLst>
+          </p:cNvPr>
+          <p:cNvPicPr>
+            <a:picLocks noChangeAspect="1"/>
+          </p:cNvPicPr>
+          <p:nvPr/>
+        </p:nvPicPr>
+        <p:blipFill>
+          <a:blip r:embed="rId2"/>
+          <a:stretch>
+            <a:fillRect/>
+          </a:stretch>
+        </p:blipFill>
+        <p:spPr>
+          <a:xfrm>
+            <a:off x="447594" y="989475"/>
+            <a:ext cx="5773917" cy="3496800"/>
+          </a:xfrm>
+          <a:prstGeom prst="rect">
+            <a:avLst/>
+          </a:prstGeom>
+        </p:spPr>
+      </p:pic>
+    </p:spTree>
+    <p:extLst>
+      <p:ext uri="{BB962C8B-B14F-4D97-AF65-F5344CB8AC3E}">
+        <p14:creationId xmlns:p14="http://schemas.microsoft.com/office/powerpoint/2010/main" val="115699769"/>
+      </p:ext>
+    </p:extLst>
+  </p:cSld>
+  <p:clrMapOvr>
+    <a:masterClrMapping/>
+  </p:clrMapOvr>
+</p:sld>
+</file>
+
+<file path=ppt/slides/slide11.xml><?xml version="1.0" encoding="utf-8"?>
+<p:sld xmlns:a="http://schemas.openxmlformats.org/drawingml/2006/main" xmlns:r="http://schemas.openxmlformats.org/officeDocument/2006/relationships" xmlns:p="http://schemas.openxmlformats.org/presentationml/2006/main">
+  <p:cSld>
+    <p:spTree>
+      <p:nvGrpSpPr>
+        <p:cNvPr id="1" name=""/>
+        <p:cNvGrpSpPr/>
+        <p:nvPr/>
+      </p:nvGrpSpPr>
+      <p:grpSpPr>
+        <a:xfrm>
+          <a:off x="0" y="0"/>
+          <a:ext cx="0" cy="0"/>
+          <a:chOff x="0" y="0"/>
+          <a:chExt cx="0" cy="0"/>
+        </a:xfrm>
+      </p:grpSpPr>
+      <p:sp>
+        <p:nvSpPr>
+          <p:cNvPr id="2" name="Text Placeholder 1">
+            <a:extLst>
+              <a:ext uri="{FF2B5EF4-FFF2-40B4-BE49-F238E27FC236}">
+                <a16:creationId xmlns:a16="http://schemas.microsoft.com/office/drawing/2014/main" id="{271C6E68-3238-0462-80CF-39AC8DE86C89}"/>
+              </a:ext>
+            </a:extLst>
+          </p:cNvPr>
+          <p:cNvSpPr>
+            <a:spLocks noGrp="1"/>
+          </p:cNvSpPr>
+          <p:nvPr>
+            <p:ph type="body" idx="1"/>
+          </p:nvPr>
+        </p:nvSpPr>
+        <p:spPr>
+          <a:xfrm>
+            <a:off x="618825" y="1077456"/>
+            <a:ext cx="8103694" cy="3430249"/>
+          </a:xfrm>
+        </p:spPr>
+        <p:txBody>
+          <a:bodyPr/>
+          <a:lstStyle/>
+          <a:p>
+            <a:endParaRPr lang="en-US" dirty="0"/>
+          </a:p>
+        </p:txBody>
+      </p:sp>
+      <p:sp>
+        <p:nvSpPr>
+          <p:cNvPr id="3" name="Title 2">
+            <a:extLst>
+              <a:ext uri="{FF2B5EF4-FFF2-40B4-BE49-F238E27FC236}">
+                <a16:creationId xmlns:a16="http://schemas.microsoft.com/office/drawing/2014/main" id="{A57207FF-91BB-5B81-DC9B-4C1E156EF9F7}"/>
+              </a:ext>
+            </a:extLst>
+          </p:cNvPr>
+          <p:cNvSpPr>
+            <a:spLocks noGrp="1"/>
+          </p:cNvSpPr>
+          <p:nvPr>
+            <p:ph type="ctrTitle"/>
+          </p:nvPr>
+        </p:nvSpPr>
+        <p:spPr/>
+        <p:txBody>
+          <a:bodyPr/>
+          <a:lstStyle/>
+          <a:p>
+            <a:r>
+              <a:rPr lang="en-US" dirty="0"/>
+              <a:t>Data Visualization - Jordan</a:t>
+            </a:r>
+          </a:p>
+        </p:txBody>
+      </p:sp>
+    </p:spTree>
+    <p:extLst>
+      <p:ext uri="{BB962C8B-B14F-4D97-AF65-F5344CB8AC3E}">
+        <p14:creationId xmlns:p14="http://schemas.microsoft.com/office/powerpoint/2010/main" val="1073087881"/>
+      </p:ext>
+    </p:extLst>
+  </p:cSld>
+  <p:clrMapOvr>
+    <a:masterClrMapping/>
+  </p:clrMapOvr>
+</p:sld>
+</file>
+
+<file path=ppt/slides/slide12.xml><?xml version="1.0" encoding="utf-8"?>
+<p:sld xmlns:a="http://schemas.openxmlformats.org/drawingml/2006/main" xmlns:r="http://schemas.openxmlformats.org/officeDocument/2006/relationships" xmlns:p="http://schemas.openxmlformats.org/presentationml/2006/main">
+  <p:cSld>
+    <p:spTree>
+      <p:nvGrpSpPr>
+        <p:cNvPr id="1" name=""/>
+        <p:cNvGrpSpPr/>
+        <p:nvPr/>
+      </p:nvGrpSpPr>
+      <p:grpSpPr>
+        <a:xfrm>
+          <a:off x="0" y="0"/>
+          <a:ext cx="0" cy="0"/>
+          <a:chOff x="0" y="0"/>
+          <a:chExt cx="0" cy="0"/>
+        </a:xfrm>
+      </p:grpSpPr>
+      <p:sp>
+        <p:nvSpPr>
+          <p:cNvPr id="2" name="Text Placeholder 1">
+            <a:extLst>
+              <a:ext uri="{FF2B5EF4-FFF2-40B4-BE49-F238E27FC236}">
+                <a16:creationId xmlns:a16="http://schemas.microsoft.com/office/drawing/2014/main" id="{FB99BD7B-25D4-E8B4-9B83-AAA654AA73E7}"/>
+              </a:ext>
+            </a:extLst>
+          </p:cNvPr>
+          <p:cNvSpPr>
+            <a:spLocks noGrp="1"/>
+          </p:cNvSpPr>
+          <p:nvPr>
+            <p:ph type="body" idx="1"/>
+          </p:nvPr>
+        </p:nvSpPr>
+        <p:spPr>
+          <a:xfrm>
+            <a:off x="618824" y="989475"/>
+            <a:ext cx="4931870" cy="3582526"/>
+          </a:xfrm>
+        </p:spPr>
+        <p:txBody>
+          <a:bodyPr/>
+          <a:lstStyle/>
+          <a:p>
+            <a:r>
+              <a:rPr lang="en-US" dirty="0"/>
+              <a:t>National UFO Reporting Center Recommendations: </a:t>
+            </a:r>
+          </a:p>
+          <a:p>
+            <a:pPr lvl="1">
+              <a:spcBef>
+                <a:spcPts val="0"/>
+              </a:spcBef>
+            </a:pPr>
+            <a:r>
+              <a:rPr lang="en-US" dirty="0"/>
+              <a:t>Less free form answers – more drop down options to reduce the amount of non-sense data or variability in the data. </a:t>
+            </a:r>
+          </a:p>
+          <a:p>
+            <a:pPr lvl="1">
+              <a:spcBef>
+                <a:spcPts val="0"/>
+              </a:spcBef>
+            </a:pPr>
+            <a:r>
+              <a:rPr lang="en-US" dirty="0"/>
+              <a:t>Sighting Validation – new column or area of data where NUFORC can add their feedback that either approves or denies the sightings. Currently it is listed in the comment box. </a:t>
+            </a:r>
+          </a:p>
+          <a:p>
+            <a:pPr marL="609600" lvl="1" indent="0">
+              <a:spcBef>
+                <a:spcPts val="0"/>
+              </a:spcBef>
+              <a:buNone/>
+            </a:pPr>
+            <a:endParaRPr lang="en-US" dirty="0"/>
+          </a:p>
+          <a:p>
+            <a:r>
+              <a:rPr lang="en-US" dirty="0"/>
+              <a:t>Additional Datasets to include:</a:t>
+            </a:r>
+          </a:p>
+          <a:p>
+            <a:pPr lvl="1">
+              <a:spcBef>
+                <a:spcPts val="0"/>
+              </a:spcBef>
+            </a:pPr>
+            <a:r>
+              <a:rPr lang="en-US" dirty="0"/>
+              <a:t>Weather Patterns</a:t>
+            </a:r>
+          </a:p>
+          <a:p>
+            <a:pPr lvl="1">
+              <a:spcBef>
+                <a:spcPts val="0"/>
+              </a:spcBef>
+            </a:pPr>
+            <a:r>
+              <a:rPr lang="en-US" dirty="0"/>
+              <a:t>Locations of Government Testing Sites, Military Bases and other business locations that might effect the data.</a:t>
+            </a:r>
+          </a:p>
+        </p:txBody>
+      </p:sp>
+      <p:sp>
+        <p:nvSpPr>
+          <p:cNvPr id="3" name="Title 2">
+            <a:extLst>
+              <a:ext uri="{FF2B5EF4-FFF2-40B4-BE49-F238E27FC236}">
+                <a16:creationId xmlns:a16="http://schemas.microsoft.com/office/drawing/2014/main" id="{F68672B0-6614-5709-0D3A-EC8192DAA033}"/>
+              </a:ext>
+            </a:extLst>
+          </p:cNvPr>
+          <p:cNvSpPr>
+            <a:spLocks noGrp="1"/>
+          </p:cNvSpPr>
+          <p:nvPr>
+            <p:ph type="ctrTitle"/>
+          </p:nvPr>
+        </p:nvSpPr>
+        <p:spPr>
+          <a:xfrm>
+            <a:off x="618824" y="411675"/>
+            <a:ext cx="5946281" cy="577800"/>
+          </a:xfrm>
+        </p:spPr>
+        <p:txBody>
+          <a:bodyPr/>
+          <a:lstStyle/>
+          <a:p>
+            <a:r>
+              <a:rPr lang="en-US" dirty="0"/>
+              <a:t>Recommendations for Future Analysis</a:t>
+            </a:r>
+          </a:p>
+        </p:txBody>
+      </p:sp>
+      <p:pic>
+        <p:nvPicPr>
+          <p:cNvPr id="5" name="Picture 4">
+            <a:extLst>
+              <a:ext uri="{FF2B5EF4-FFF2-40B4-BE49-F238E27FC236}">
+                <a16:creationId xmlns:a16="http://schemas.microsoft.com/office/drawing/2014/main" id="{617C7790-B501-F9F5-7F13-C1B8A6771729}"/>
+              </a:ext>
+            </a:extLst>
+          </p:cNvPr>
+          <p:cNvPicPr>
+            <a:picLocks noChangeAspect="1"/>
+          </p:cNvPicPr>
+          <p:nvPr/>
+        </p:nvPicPr>
+        <p:blipFill>
+          <a:blip r:embed="rId2"/>
+          <a:stretch>
+            <a:fillRect/>
+          </a:stretch>
+        </p:blipFill>
+        <p:spPr>
+          <a:xfrm>
+            <a:off x="5922170" y="989475"/>
+            <a:ext cx="2713088" cy="2730660"/>
+          </a:xfrm>
+          <a:prstGeom prst="rect">
+            <a:avLst/>
+          </a:prstGeom>
+        </p:spPr>
+      </p:pic>
+    </p:spTree>
+    <p:extLst>
+      <p:ext uri="{BB962C8B-B14F-4D97-AF65-F5344CB8AC3E}">
+        <p14:creationId xmlns:p14="http://schemas.microsoft.com/office/powerpoint/2010/main" val="130533884"/>
+      </p:ext>
+    </p:extLst>
+  </p:cSld>
+  <p:clrMapOvr>
+    <a:masterClrMapping/>
+  </p:clrMapOvr>
+</p:sld>
+</file>
+
+<file path=ppt/slides/slide13.xml><?xml version="1.0" encoding="utf-8"?>
+<p:sld xmlns:a="http://schemas.openxmlformats.org/drawingml/2006/main" xmlns:r="http://schemas.openxmlformats.org/officeDocument/2006/relationships" xmlns:p="http://schemas.openxmlformats.org/presentationml/2006/main">
+  <p:cSld>
+    <p:spTree>
+      <p:nvGrpSpPr>
+        <p:cNvPr id="1" name=""/>
+        <p:cNvGrpSpPr/>
+        <p:nvPr/>
+      </p:nvGrpSpPr>
+      <p:grpSpPr>
+        <a:xfrm>
+          <a:off x="0" y="0"/>
+          <a:ext cx="0" cy="0"/>
+          <a:chOff x="0" y="0"/>
+          <a:chExt cx="0" cy="0"/>
+        </a:xfrm>
+      </p:grpSpPr>
+      <p:sp>
+        <p:nvSpPr>
+          <p:cNvPr id="2" name="Text Placeholder 1">
+            <a:extLst>
+              <a:ext uri="{FF2B5EF4-FFF2-40B4-BE49-F238E27FC236}">
+                <a16:creationId xmlns:a16="http://schemas.microsoft.com/office/drawing/2014/main" id="{A83F984E-5C99-A116-FAD2-4C45504CFAF2}"/>
+              </a:ext>
+            </a:extLst>
+          </p:cNvPr>
+          <p:cNvSpPr>
+            <a:spLocks noGrp="1"/>
+          </p:cNvSpPr>
+          <p:nvPr>
+            <p:ph type="body" idx="1"/>
+          </p:nvPr>
+        </p:nvSpPr>
+        <p:spPr>
+          <a:xfrm>
+            <a:off x="618824" y="1098887"/>
+            <a:ext cx="7782225" cy="3501687"/>
+          </a:xfrm>
+        </p:spPr>
+        <p:txBody>
+          <a:bodyPr/>
+          <a:lstStyle/>
+          <a:p>
+            <a:r>
+              <a:rPr lang="en-US" dirty="0"/>
+              <a:t>Select a dataset that has less free form data to help with the machine learning models. </a:t>
+            </a:r>
+          </a:p>
+          <a:p>
+            <a:endParaRPr lang="en-US" dirty="0"/>
+          </a:p>
+          <a:p>
+            <a:endParaRPr lang="en-US" dirty="0"/>
+          </a:p>
+        </p:txBody>
+      </p:sp>
+      <p:sp>
+        <p:nvSpPr>
+          <p:cNvPr id="3" name="Title 2">
+            <a:extLst>
+              <a:ext uri="{FF2B5EF4-FFF2-40B4-BE49-F238E27FC236}">
+                <a16:creationId xmlns:a16="http://schemas.microsoft.com/office/drawing/2014/main" id="{0AF93862-50BF-387D-89F2-EB6E78FD4360}"/>
+              </a:ext>
+            </a:extLst>
+          </p:cNvPr>
+          <p:cNvSpPr>
+            <a:spLocks noGrp="1"/>
+          </p:cNvSpPr>
+          <p:nvPr>
+            <p:ph type="ctrTitle"/>
+          </p:nvPr>
+        </p:nvSpPr>
+        <p:spPr>
+          <a:xfrm>
+            <a:off x="618825" y="411675"/>
+            <a:ext cx="5360494" cy="577800"/>
+          </a:xfrm>
+        </p:spPr>
+        <p:txBody>
+          <a:bodyPr/>
+          <a:lstStyle/>
+          <a:p>
+            <a:r>
+              <a:rPr lang="en-US" dirty="0"/>
+              <a:t>Project Debrief – Lessons Learned</a:t>
+            </a:r>
+          </a:p>
+        </p:txBody>
+      </p:sp>
+    </p:spTree>
+    <p:extLst>
+      <p:ext uri="{BB962C8B-B14F-4D97-AF65-F5344CB8AC3E}">
+        <p14:creationId xmlns:p14="http://schemas.microsoft.com/office/powerpoint/2010/main" val="3019675164"/>
+      </p:ext>
+    </p:extLst>
+  </p:cSld>
+  <p:clrMapOvr>
+    <a:masterClrMapping/>
+  </p:clrMapOvr>
+</p:sld>
+</file>
+
+<file path=ppt/slides/slide14.xml><?xml version="1.0" encoding="utf-8"?>
+<p:sld xmlns:a="http://schemas.openxmlformats.org/drawingml/2006/main" xmlns:r="http://schemas.openxmlformats.org/officeDocument/2006/relationships" xmlns:p="http://schemas.openxmlformats.org/presentationml/2006/main">
+  <p:cSld>
+    <p:spTree>
+      <p:nvGrpSpPr>
+        <p:cNvPr id="1" name=""/>
+        <p:cNvGrpSpPr/>
+        <p:nvPr/>
+      </p:nvGrpSpPr>
+      <p:grpSpPr>
+        <a:xfrm>
+          <a:off x="0" y="0"/>
+          <a:ext cx="0" cy="0"/>
+          <a:chOff x="0" y="0"/>
+          <a:chExt cx="0" cy="0"/>
+        </a:xfrm>
+      </p:grpSpPr>
+      <p:sp>
+        <p:nvSpPr>
+          <p:cNvPr id="2" name="Text Placeholder 1">
+            <a:extLst>
+              <a:ext uri="{FF2B5EF4-FFF2-40B4-BE49-F238E27FC236}">
+                <a16:creationId xmlns:a16="http://schemas.microsoft.com/office/drawing/2014/main" id="{ED5EBFA3-A24D-B72D-C1ED-E04004F75998}"/>
+              </a:ext>
+            </a:extLst>
+          </p:cNvPr>
+          <p:cNvSpPr>
+            <a:spLocks noGrp="1"/>
+          </p:cNvSpPr>
+          <p:nvPr>
+            <p:ph type="body" idx="1"/>
+          </p:nvPr>
+        </p:nvSpPr>
+        <p:spPr/>
+        <p:txBody>
+          <a:bodyPr/>
+          <a:lstStyle/>
+          <a:p>
+            <a:endParaRPr lang="en-US"/>
+          </a:p>
+        </p:txBody>
+      </p:sp>
+      <p:sp>
+        <p:nvSpPr>
+          <p:cNvPr id="3" name="Title 2">
+            <a:extLst>
+              <a:ext uri="{FF2B5EF4-FFF2-40B4-BE49-F238E27FC236}">
+                <a16:creationId xmlns:a16="http://schemas.microsoft.com/office/drawing/2014/main" id="{B6D395C6-538A-7D0F-F2A0-68B6F269A344}"/>
+              </a:ext>
+            </a:extLst>
+          </p:cNvPr>
+          <p:cNvSpPr>
+            <a:spLocks noGrp="1"/>
+          </p:cNvSpPr>
+          <p:nvPr>
+            <p:ph type="ctrTitle"/>
+          </p:nvPr>
+        </p:nvSpPr>
+        <p:spPr/>
+        <p:txBody>
+          <a:bodyPr/>
+          <a:lstStyle/>
+          <a:p>
+            <a:endParaRPr lang="en-US"/>
+          </a:p>
+        </p:txBody>
+      </p:sp>
+    </p:spTree>
+    <p:extLst>
+      <p:ext uri="{BB962C8B-B14F-4D97-AF65-F5344CB8AC3E}">
+        <p14:creationId xmlns:p14="http://schemas.microsoft.com/office/powerpoint/2010/main" val="3789641299"/>
+      </p:ext>
+    </p:extLst>
+  </p:cSld>
+  <p:clrMapOvr>
+    <a:masterClrMapping/>
+  </p:clrMapOvr>
+</p:sld>
+</file>
+
+<file path=ppt/slides/slide15.xml><?xml version="1.0" encoding="utf-8"?>
+<p:sld xmlns:a="http://schemas.openxmlformats.org/drawingml/2006/main" xmlns:r="http://schemas.openxmlformats.org/officeDocument/2006/relationships" xmlns:p="http://schemas.openxmlformats.org/presentationml/2006/main">
+  <p:cSld>
+    <p:spTree>
+      <p:nvGrpSpPr>
+        <p:cNvPr id="1" name=""/>
+        <p:cNvGrpSpPr/>
+        <p:nvPr/>
+      </p:nvGrpSpPr>
+      <p:grpSpPr>
+        <a:xfrm>
+          <a:off x="0" y="0"/>
+          <a:ext cx="0" cy="0"/>
+          <a:chOff x="0" y="0"/>
+          <a:chExt cx="0" cy="0"/>
+        </a:xfrm>
+      </p:grpSpPr>
+      <p:sp>
+        <p:nvSpPr>
+          <p:cNvPr id="2" name="Text Placeholder 1">
+            <a:extLst>
+              <a:ext uri="{FF2B5EF4-FFF2-40B4-BE49-F238E27FC236}">
+                <a16:creationId xmlns:a16="http://schemas.microsoft.com/office/drawing/2014/main" id="{89BDF6B2-C88F-0C93-4D2D-864425B8857A}"/>
+              </a:ext>
+            </a:extLst>
+          </p:cNvPr>
+          <p:cNvSpPr>
+            <a:spLocks noGrp="1"/>
+          </p:cNvSpPr>
+          <p:nvPr>
+            <p:ph type="body" idx="1"/>
+          </p:nvPr>
+        </p:nvSpPr>
+        <p:spPr/>
+        <p:txBody>
+          <a:bodyPr/>
+          <a:lstStyle/>
+          <a:p>
+            <a:endParaRPr lang="en-US"/>
+          </a:p>
+        </p:txBody>
+      </p:sp>
+      <p:sp>
+        <p:nvSpPr>
+          <p:cNvPr id="3" name="Title 2">
+            <a:extLst>
+              <a:ext uri="{FF2B5EF4-FFF2-40B4-BE49-F238E27FC236}">
+                <a16:creationId xmlns:a16="http://schemas.microsoft.com/office/drawing/2014/main" id="{E30C4615-5792-3F05-8912-7AEFC104542E}"/>
+              </a:ext>
+            </a:extLst>
+          </p:cNvPr>
+          <p:cNvSpPr>
+            <a:spLocks noGrp="1"/>
+          </p:cNvSpPr>
+          <p:nvPr>
+            <p:ph type="ctrTitle"/>
+          </p:nvPr>
+        </p:nvSpPr>
+        <p:spPr/>
+        <p:txBody>
+          <a:bodyPr/>
+          <a:lstStyle/>
+          <a:p>
+            <a:endParaRPr lang="en-US"/>
+          </a:p>
+        </p:txBody>
+      </p:sp>
+    </p:spTree>
+    <p:extLst>
+      <p:ext uri="{BB962C8B-B14F-4D97-AF65-F5344CB8AC3E}">
+        <p14:creationId xmlns:p14="http://schemas.microsoft.com/office/powerpoint/2010/main" val="1039797830"/>
+      </p:ext>
+    </p:extLst>
+  </p:cSld>
+  <p:clrMapOvr>
+    <a:masterClrMapping/>
+  </p:clrMapOvr>
+</p:sld>
+</file>
+
 <file path=ppt/slides/slide2.xml><?xml version="1.0" encoding="utf-8"?>
+<p:sld xmlns:a="http://schemas.openxmlformats.org/drawingml/2006/main" xmlns:r="http://schemas.openxmlformats.org/officeDocument/2006/relationships" xmlns:p="http://schemas.openxmlformats.org/presentationml/2006/main">
+  <p:cSld>
+    <p:spTree>
+      <p:nvGrpSpPr>
+        <p:cNvPr id="1" name=""/>
+        <p:cNvGrpSpPr/>
+        <p:nvPr/>
+      </p:nvGrpSpPr>
+      <p:grpSpPr>
+        <a:xfrm>
+          <a:off x="0" y="0"/>
+          <a:ext cx="0" cy="0"/>
+          <a:chOff x="0" y="0"/>
+          <a:chExt cx="0" cy="0"/>
+        </a:xfrm>
+      </p:grpSpPr>
+      <p:sp>
+        <p:nvSpPr>
+          <p:cNvPr id="2" name="Text Placeholder 1">
+            <a:extLst>
+              <a:ext uri="{FF2B5EF4-FFF2-40B4-BE49-F238E27FC236}">
+                <a16:creationId xmlns:a16="http://schemas.microsoft.com/office/drawing/2014/main" id="{69FE4CC2-9375-1D58-99A9-479840BC5E93}"/>
+              </a:ext>
+            </a:extLst>
+          </p:cNvPr>
+          <p:cNvSpPr>
+            <a:spLocks noGrp="1"/>
+          </p:cNvSpPr>
+          <p:nvPr>
+            <p:ph type="body" idx="1"/>
+          </p:nvPr>
+        </p:nvSpPr>
+        <p:spPr>
+          <a:xfrm>
+            <a:off x="704030" y="1163180"/>
+            <a:ext cx="4896669" cy="3130213"/>
+          </a:xfrm>
+        </p:spPr>
+        <p:txBody>
+          <a:bodyPr/>
+          <a:lstStyle/>
+          <a:p>
+            <a:r>
+              <a:rPr lang="en-US" dirty="0"/>
+              <a:t>Connie Aceves</a:t>
+            </a:r>
+          </a:p>
+          <a:p>
+            <a:r>
+              <a:rPr lang="en-US" dirty="0"/>
+              <a:t>Angelica Rosario</a:t>
+            </a:r>
+          </a:p>
+          <a:p>
+            <a:r>
+              <a:rPr lang="en-US" dirty="0"/>
+              <a:t>Jordan Peterson</a:t>
+            </a:r>
+          </a:p>
+          <a:p>
+            <a:r>
+              <a:rPr lang="en-US" dirty="0"/>
+              <a:t>Katie Bernstein</a:t>
+            </a:r>
+          </a:p>
+        </p:txBody>
+      </p:sp>
+      <p:sp>
+        <p:nvSpPr>
+          <p:cNvPr id="3" name="Title 2">
+            <a:extLst>
+              <a:ext uri="{FF2B5EF4-FFF2-40B4-BE49-F238E27FC236}">
+                <a16:creationId xmlns:a16="http://schemas.microsoft.com/office/drawing/2014/main" id="{1813C97E-324C-4209-A51C-59B8E6216C84}"/>
+              </a:ext>
+            </a:extLst>
+          </p:cNvPr>
+          <p:cNvSpPr>
+            <a:spLocks noGrp="1"/>
+          </p:cNvSpPr>
+          <p:nvPr>
+            <p:ph type="ctrTitle"/>
+          </p:nvPr>
+        </p:nvSpPr>
+        <p:spPr/>
+        <p:txBody>
+          <a:bodyPr/>
+          <a:lstStyle/>
+          <a:p>
+            <a:r>
+              <a:rPr lang="en-US" dirty="0"/>
+              <a:t>Team Members</a:t>
+            </a:r>
+          </a:p>
+        </p:txBody>
+      </p:sp>
+    </p:spTree>
+    <p:extLst>
+      <p:ext uri="{BB962C8B-B14F-4D97-AF65-F5344CB8AC3E}">
+        <p14:creationId xmlns:p14="http://schemas.microsoft.com/office/powerpoint/2010/main" val="1309927215"/>
+      </p:ext>
+    </p:extLst>
+  </p:cSld>
+  <p:clrMapOvr>
+    <a:masterClrMapping/>
+  </p:clrMapOvr>
+</p:sld>
+</file>
+
+<file path=ppt/slides/slide3.xml><?xml version="1.0" encoding="utf-8"?>
 <p:sld xmlns:a="http://schemas.openxmlformats.org/drawingml/2006/main" xmlns:r="http://schemas.openxmlformats.org/officeDocument/2006/relationships" xmlns:p="http://schemas.openxmlformats.org/presentationml/2006/main">
   <p:cSld>
     <p:spTree>
@@ -38617,7 +39419,7 @@
         </p:nvSpPr>
         <p:spPr>
           <a:xfrm>
-            <a:off x="814387" y="1827469"/>
+            <a:off x="833478" y="2385346"/>
             <a:ext cx="7272337" cy="2901694"/>
           </a:xfrm>
         </p:spPr>
@@ -38630,15 +39432,15 @@
               <a:buChar char="•"/>
             </a:pPr>
             <a:r>
-              <a:rPr lang="en-US" dirty="0"/>
+              <a:rPr lang="en-US" sz="1600" dirty="0"/>
               <a:t>Arizona has the 7</a:t>
             </a:r>
             <a:r>
-              <a:rPr lang="en-US" baseline="30000" dirty="0"/>
+              <a:rPr lang="en-US" sz="1600" baseline="30000" dirty="0"/>
               <a:t>th</a:t>
             </a:r>
             <a:r>
-              <a:rPr lang="en-US" dirty="0"/>
+              <a:rPr lang="en-US" sz="1600" dirty="0"/>
               <a:t> highest number of UFO sightings in the USA. </a:t>
             </a:r>
           </a:p>
@@ -38648,7 +39450,7 @@
               <a:buChar char="•"/>
             </a:pPr>
             <a:r>
-              <a:rPr lang="en-US" dirty="0"/>
+              <a:rPr lang="en-US" sz="1600" dirty="0"/>
               <a:t>UFO sightings are a huge draw to tourism in Arizona and we wanted to use a data science approach to find out more about where these sightings might occur in the future. </a:t>
             </a:r>
           </a:p>
@@ -38658,7 +39460,7 @@
               <a:buChar char="•"/>
             </a:pPr>
             <a:r>
-              <a:rPr lang="en-US" dirty="0"/>
+              <a:rPr lang="en-US" sz="1600" dirty="0"/>
               <a:t>As residents of Arizona, we are interested in where the sightings occur and how they might be influenced by the population increase in Arizona over the last 20 years. </a:t>
             </a:r>
           </a:p>
@@ -38668,7 +39470,7 @@
               <a:buChar char="•"/>
             </a:pPr>
             <a:r>
-              <a:rPr lang="en-US" dirty="0"/>
+              <a:rPr lang="en-US" sz="1600" dirty="0"/>
               <a:t>There are UFO Conferences held in Arizona because of the high rate of sightings and interest. </a:t>
             </a:r>
           </a:p>
@@ -38681,293 +39483,36 @@
           </a:p>
         </p:txBody>
       </p:sp>
-      <p:sp>
-        <p:nvSpPr>
-          <p:cNvPr id="6" name="Subtitle 2">
+      <p:pic>
+        <p:nvPicPr>
+          <p:cNvPr id="5" name="Picture 4">
             <a:extLst>
               <a:ext uri="{FF2B5EF4-FFF2-40B4-BE49-F238E27FC236}">
-                <a16:creationId xmlns:a16="http://schemas.microsoft.com/office/drawing/2014/main" id="{10B5451F-F899-15E5-8CBD-A0FEB3515817}"/>
+                <a16:creationId xmlns:a16="http://schemas.microsoft.com/office/drawing/2014/main" id="{7D878D1D-E110-8267-19BF-7A577E85DD43}"/>
               </a:ext>
             </a:extLst>
           </p:cNvPr>
-          <p:cNvSpPr txBox="1">
-            <a:spLocks/>
-          </p:cNvSpPr>
+          <p:cNvPicPr>
+            <a:picLocks noChangeAspect="1"/>
+          </p:cNvPicPr>
           <p:nvPr/>
-        </p:nvSpPr>
+        </p:nvPicPr>
+        <p:blipFill>
+          <a:blip r:embed="rId3"/>
+          <a:stretch>
+            <a:fillRect/>
+          </a:stretch>
+        </p:blipFill>
         <p:spPr>
           <a:xfrm>
-            <a:off x="1493768" y="1363791"/>
-            <a:ext cx="5447576" cy="463678"/>
+            <a:off x="3021807" y="1092994"/>
+            <a:ext cx="2260601" cy="1271588"/>
           </a:xfrm>
           <a:prstGeom prst="rect">
             <a:avLst/>
           </a:prstGeom>
-          <a:noFill/>
-          <a:ln>
-            <a:noFill/>
-          </a:ln>
         </p:spPr>
-        <p:txBody>
-          <a:bodyPr spcFirstLastPara="1" wrap="square" lIns="91425" tIns="91425" rIns="91425" bIns="91425" anchor="t" anchorCtr="0">
-            <a:noAutofit/>
-          </a:bodyPr>
-          <a:lstStyle>
-            <a:defPPr marR="0" lvl="0" algn="l" rtl="0">
-              <a:lnSpc>
-                <a:spcPct val="100000"/>
-              </a:lnSpc>
-              <a:spcBef>
-                <a:spcPts val="0"/>
-              </a:spcBef>
-              <a:spcAft>
-                <a:spcPts val="0"/>
-              </a:spcAft>
-            </a:defPPr>
-            <a:lvl1pPr marL="457200" marR="0" lvl="0" indent="-342900" algn="ctr" rtl="0">
-              <a:lnSpc>
-                <a:spcPct val="100000"/>
-              </a:lnSpc>
-              <a:spcBef>
-                <a:spcPts val="0"/>
-              </a:spcBef>
-              <a:spcAft>
-                <a:spcPts val="0"/>
-              </a:spcAft>
-              <a:buClr>
-                <a:srgbClr val="000000"/>
-              </a:buClr>
-              <a:buSzPts val="1000"/>
-              <a:buFont typeface="Maven Pro"/>
-              <a:buNone/>
-              <a:defRPr sz="1800" b="0" i="0" u="none" strike="noStrike" cap="none">
-                <a:solidFill>
-                  <a:schemeClr val="lt1"/>
-                </a:solidFill>
-                <a:latin typeface="Maven Pro"/>
-                <a:ea typeface="Maven Pro"/>
-                <a:cs typeface="Maven Pro"/>
-                <a:sym typeface="Maven Pro"/>
-              </a:defRPr>
-            </a:lvl1pPr>
-            <a:lvl2pPr marL="914400" marR="0" lvl="1" indent="-317500" algn="l" rtl="0">
-              <a:lnSpc>
-                <a:spcPct val="100000"/>
-              </a:lnSpc>
-              <a:spcBef>
-                <a:spcPts val="0"/>
-              </a:spcBef>
-              <a:spcAft>
-                <a:spcPts val="0"/>
-              </a:spcAft>
-              <a:buClr>
-                <a:srgbClr val="000000"/>
-              </a:buClr>
-              <a:buSzPts val="1000"/>
-              <a:buFont typeface="Maven Pro"/>
-              <a:buNone/>
-              <a:defRPr sz="1000" b="0" i="0" u="none" strike="noStrike" cap="none">
-                <a:solidFill>
-                  <a:srgbClr val="000000"/>
-                </a:solidFill>
-                <a:latin typeface="Maven Pro"/>
-                <a:ea typeface="Maven Pro"/>
-                <a:cs typeface="Maven Pro"/>
-                <a:sym typeface="Maven Pro"/>
-              </a:defRPr>
-            </a:lvl2pPr>
-            <a:lvl3pPr marL="1371600" marR="0" lvl="2" indent="-317500" algn="l" rtl="0">
-              <a:lnSpc>
-                <a:spcPct val="100000"/>
-              </a:lnSpc>
-              <a:spcBef>
-                <a:spcPts val="0"/>
-              </a:spcBef>
-              <a:spcAft>
-                <a:spcPts val="0"/>
-              </a:spcAft>
-              <a:buClr>
-                <a:srgbClr val="000000"/>
-              </a:buClr>
-              <a:buSzPts val="1000"/>
-              <a:buFont typeface="Maven Pro"/>
-              <a:buNone/>
-              <a:defRPr sz="1000" b="0" i="0" u="none" strike="noStrike" cap="none">
-                <a:solidFill>
-                  <a:srgbClr val="000000"/>
-                </a:solidFill>
-                <a:latin typeface="Maven Pro"/>
-                <a:ea typeface="Maven Pro"/>
-                <a:cs typeface="Maven Pro"/>
-                <a:sym typeface="Maven Pro"/>
-              </a:defRPr>
-            </a:lvl3pPr>
-            <a:lvl4pPr marL="1828800" marR="0" lvl="3" indent="-317500" algn="l" rtl="0">
-              <a:lnSpc>
-                <a:spcPct val="100000"/>
-              </a:lnSpc>
-              <a:spcBef>
-                <a:spcPts val="0"/>
-              </a:spcBef>
-              <a:spcAft>
-                <a:spcPts val="0"/>
-              </a:spcAft>
-              <a:buClr>
-                <a:srgbClr val="000000"/>
-              </a:buClr>
-              <a:buSzPts val="1000"/>
-              <a:buFont typeface="Maven Pro"/>
-              <a:buNone/>
-              <a:defRPr sz="1000" b="0" i="0" u="none" strike="noStrike" cap="none">
-                <a:solidFill>
-                  <a:srgbClr val="000000"/>
-                </a:solidFill>
-                <a:latin typeface="Maven Pro"/>
-                <a:ea typeface="Maven Pro"/>
-                <a:cs typeface="Maven Pro"/>
-                <a:sym typeface="Maven Pro"/>
-              </a:defRPr>
-            </a:lvl4pPr>
-            <a:lvl5pPr marL="2286000" marR="0" lvl="4" indent="-317500" algn="l" rtl="0">
-              <a:lnSpc>
-                <a:spcPct val="100000"/>
-              </a:lnSpc>
-              <a:spcBef>
-                <a:spcPts val="0"/>
-              </a:spcBef>
-              <a:spcAft>
-                <a:spcPts val="0"/>
-              </a:spcAft>
-              <a:buClr>
-                <a:srgbClr val="000000"/>
-              </a:buClr>
-              <a:buSzPts val="1000"/>
-              <a:buFont typeface="Maven Pro"/>
-              <a:buNone/>
-              <a:defRPr sz="1000" b="0" i="0" u="none" strike="noStrike" cap="none">
-                <a:solidFill>
-                  <a:srgbClr val="000000"/>
-                </a:solidFill>
-                <a:latin typeface="Maven Pro"/>
-                <a:ea typeface="Maven Pro"/>
-                <a:cs typeface="Maven Pro"/>
-                <a:sym typeface="Maven Pro"/>
-              </a:defRPr>
-            </a:lvl5pPr>
-            <a:lvl6pPr marL="2743200" marR="0" lvl="5" indent="-317500" algn="l" rtl="0">
-              <a:lnSpc>
-                <a:spcPct val="100000"/>
-              </a:lnSpc>
-              <a:spcBef>
-                <a:spcPts val="0"/>
-              </a:spcBef>
-              <a:spcAft>
-                <a:spcPts val="0"/>
-              </a:spcAft>
-              <a:buClr>
-                <a:srgbClr val="000000"/>
-              </a:buClr>
-              <a:buSzPts val="1000"/>
-              <a:buFont typeface="Maven Pro"/>
-              <a:buNone/>
-              <a:defRPr sz="1000" b="0" i="0" u="none" strike="noStrike" cap="none">
-                <a:solidFill>
-                  <a:srgbClr val="000000"/>
-                </a:solidFill>
-                <a:latin typeface="Maven Pro"/>
-                <a:ea typeface="Maven Pro"/>
-                <a:cs typeface="Maven Pro"/>
-                <a:sym typeface="Maven Pro"/>
-              </a:defRPr>
-            </a:lvl6pPr>
-            <a:lvl7pPr marL="3200400" marR="0" lvl="6" indent="-317500" algn="l" rtl="0">
-              <a:lnSpc>
-                <a:spcPct val="100000"/>
-              </a:lnSpc>
-              <a:spcBef>
-                <a:spcPts val="0"/>
-              </a:spcBef>
-              <a:spcAft>
-                <a:spcPts val="0"/>
-              </a:spcAft>
-              <a:buClr>
-                <a:srgbClr val="000000"/>
-              </a:buClr>
-              <a:buSzPts val="1000"/>
-              <a:buFont typeface="Maven Pro"/>
-              <a:buNone/>
-              <a:defRPr sz="1000" b="0" i="0" u="none" strike="noStrike" cap="none">
-                <a:solidFill>
-                  <a:srgbClr val="000000"/>
-                </a:solidFill>
-                <a:latin typeface="Maven Pro"/>
-                <a:ea typeface="Maven Pro"/>
-                <a:cs typeface="Maven Pro"/>
-                <a:sym typeface="Maven Pro"/>
-              </a:defRPr>
-            </a:lvl7pPr>
-            <a:lvl8pPr marL="3657600" marR="0" lvl="7" indent="-317500" algn="l" rtl="0">
-              <a:lnSpc>
-                <a:spcPct val="100000"/>
-              </a:lnSpc>
-              <a:spcBef>
-                <a:spcPts val="0"/>
-              </a:spcBef>
-              <a:spcAft>
-                <a:spcPts val="0"/>
-              </a:spcAft>
-              <a:buClr>
-                <a:srgbClr val="000000"/>
-              </a:buClr>
-              <a:buSzPts val="1000"/>
-              <a:buFont typeface="Maven Pro"/>
-              <a:buNone/>
-              <a:defRPr sz="1000" b="0" i="0" u="none" strike="noStrike" cap="none">
-                <a:solidFill>
-                  <a:srgbClr val="000000"/>
-                </a:solidFill>
-                <a:latin typeface="Maven Pro"/>
-                <a:ea typeface="Maven Pro"/>
-                <a:cs typeface="Maven Pro"/>
-                <a:sym typeface="Maven Pro"/>
-              </a:defRPr>
-            </a:lvl8pPr>
-            <a:lvl9pPr marL="4114800" marR="0" lvl="8" indent="-317500" algn="l" rtl="0">
-              <a:lnSpc>
-                <a:spcPct val="100000"/>
-              </a:lnSpc>
-              <a:spcBef>
-                <a:spcPts val="0"/>
-              </a:spcBef>
-              <a:spcAft>
-                <a:spcPts val="0"/>
-              </a:spcAft>
-              <a:buClr>
-                <a:srgbClr val="000000"/>
-              </a:buClr>
-              <a:buSzPts val="1000"/>
-              <a:buFont typeface="Maven Pro"/>
-              <a:buNone/>
-              <a:defRPr sz="1000" b="0" i="0" u="none" strike="noStrike" cap="none">
-                <a:solidFill>
-                  <a:srgbClr val="000000"/>
-                </a:solidFill>
-                <a:latin typeface="Maven Pro"/>
-                <a:ea typeface="Maven Pro"/>
-                <a:cs typeface="Maven Pro"/>
-                <a:sym typeface="Maven Pro"/>
-              </a:defRPr>
-            </a:lvl9pPr>
-          </a:lstStyle>
-          <a:p>
-            <a:pPr algn="l"/>
-            <a:r>
-              <a:rPr lang="en-US" dirty="0"/>
-              <a:t>Why we chose this topic/dataset:</a:t>
-            </a:r>
-          </a:p>
-        </p:txBody>
-      </p:sp>
+      </p:pic>
     </p:spTree>
     <p:extLst>
       <p:ext uri="{BB962C8B-B14F-4D97-AF65-F5344CB8AC3E}">
@@ -38981,7 +39526,7 @@
 </p:sld>
 </file>
 
-<file path=ppt/slides/slide3.xml><?xml version="1.0" encoding="utf-8"?>
+<file path=ppt/slides/slide4.xml><?xml version="1.0" encoding="utf-8"?>
 <p:sld xmlns:a="http://schemas.openxmlformats.org/drawingml/2006/main" xmlns:r="http://schemas.openxmlformats.org/officeDocument/2006/relationships" xmlns:p="http://schemas.openxmlformats.org/presentationml/2006/main">
   <p:cSld>
     <p:spTree>
@@ -39124,7 +39669,154 @@
 </p:sld>
 </file>
 
-<file path=ppt/slides/slide4.xml><?xml version="1.0" encoding="utf-8"?>
+<file path=ppt/slides/slide5.xml><?xml version="1.0" encoding="utf-8"?>
+<p:sld xmlns:a="http://schemas.openxmlformats.org/drawingml/2006/main" xmlns:r="http://schemas.openxmlformats.org/officeDocument/2006/relationships" xmlns:p="http://schemas.openxmlformats.org/presentationml/2006/main">
+  <p:cSld>
+    <p:spTree>
+      <p:nvGrpSpPr>
+        <p:cNvPr id="1" name=""/>
+        <p:cNvGrpSpPr/>
+        <p:nvPr/>
+      </p:nvGrpSpPr>
+      <p:grpSpPr>
+        <a:xfrm>
+          <a:off x="0" y="0"/>
+          <a:ext cx="0" cy="0"/>
+          <a:chOff x="0" y="0"/>
+          <a:chExt cx="0" cy="0"/>
+        </a:xfrm>
+      </p:grpSpPr>
+      <p:sp>
+        <p:nvSpPr>
+          <p:cNvPr id="2" name="Text Placeholder 1">
+            <a:extLst>
+              <a:ext uri="{FF2B5EF4-FFF2-40B4-BE49-F238E27FC236}">
+                <a16:creationId xmlns:a16="http://schemas.microsoft.com/office/drawing/2014/main" id="{86C96607-1E1E-5768-8BD7-137A2BC1A5DB}"/>
+              </a:ext>
+            </a:extLst>
+          </p:cNvPr>
+          <p:cNvSpPr>
+            <a:spLocks noGrp="1"/>
+          </p:cNvSpPr>
+          <p:nvPr>
+            <p:ph type="body" idx="1"/>
+          </p:nvPr>
+        </p:nvSpPr>
+        <p:spPr>
+          <a:xfrm>
+            <a:off x="618824" y="1071955"/>
+            <a:ext cx="7375032" cy="3314307"/>
+          </a:xfrm>
+        </p:spPr>
+        <p:txBody>
+          <a:bodyPr/>
+          <a:lstStyle/>
+          <a:p>
+            <a:r>
+              <a:rPr lang="en-US" sz="1600" dirty="0"/>
+              <a:t>City and Population Data Source: US Census Bureau: 	</a:t>
+            </a:r>
+            <a:r>
+              <a:rPr lang="en-US" sz="1600" dirty="0">
+                <a:hlinkClick r:id="rId2"/>
+              </a:rPr>
+              <a:t>https://data.census.gov/cedsci/</a:t>
+            </a:r>
+            <a:r>
+              <a:rPr lang="en-US" sz="1600" dirty="0"/>
+              <a:t> </a:t>
+            </a:r>
+          </a:p>
+          <a:p>
+            <a:pPr marL="114300" indent="0">
+              <a:buNone/>
+            </a:pPr>
+            <a:endParaRPr lang="en-US" sz="1600" dirty="0"/>
+          </a:p>
+          <a:p>
+            <a:r>
+              <a:rPr lang="en-US" sz="1600" dirty="0"/>
+              <a:t>World Population Review</a:t>
+            </a:r>
+          </a:p>
+          <a:p>
+            <a:pPr marL="114300" indent="0">
+              <a:buNone/>
+            </a:pPr>
+            <a:r>
+              <a:rPr lang="en-US" sz="1600" dirty="0"/>
+              <a:t>	https://</a:t>
+            </a:r>
+            <a:r>
+              <a:rPr lang="en-US" sz="1600" dirty="0" err="1"/>
+              <a:t>worldpopulationreview.com</a:t>
+            </a:r>
+            <a:r>
+              <a:rPr lang="en-US" sz="1600" dirty="0"/>
+              <a:t>/</a:t>
+            </a:r>
+          </a:p>
+          <a:p>
+            <a:endParaRPr lang="en-US" sz="1600" dirty="0"/>
+          </a:p>
+          <a:p>
+            <a:r>
+              <a:rPr lang="en-US" sz="1600" dirty="0"/>
+              <a:t>United States Census data was utilized to determine proper city naming conventions along with gathering population data for each year of the project scope (2000 to 2022) to allow us to analyze the growth of the cities in relationship to the number of sightings in each city.</a:t>
+            </a:r>
+          </a:p>
+          <a:p>
+            <a:endParaRPr lang="en-US" dirty="0"/>
+          </a:p>
+        </p:txBody>
+      </p:sp>
+      <p:sp>
+        <p:nvSpPr>
+          <p:cNvPr id="3" name="Title 2">
+            <a:extLst>
+              <a:ext uri="{FF2B5EF4-FFF2-40B4-BE49-F238E27FC236}">
+                <a16:creationId xmlns:a16="http://schemas.microsoft.com/office/drawing/2014/main" id="{CD6FCCA9-D19B-0166-A6D2-FB8F3D305971}"/>
+              </a:ext>
+            </a:extLst>
+          </p:cNvPr>
+          <p:cNvSpPr>
+            <a:spLocks noGrp="1"/>
+          </p:cNvSpPr>
+          <p:nvPr>
+            <p:ph type="ctrTitle"/>
+          </p:nvPr>
+        </p:nvSpPr>
+        <p:spPr>
+          <a:xfrm>
+            <a:off x="618824" y="411675"/>
+            <a:ext cx="4417519" cy="577800"/>
+          </a:xfrm>
+        </p:spPr>
+        <p:txBody>
+          <a:bodyPr/>
+          <a:lstStyle/>
+          <a:p>
+            <a:r>
+              <a:rPr lang="en-US" dirty="0"/>
+              <a:t>Additional Data Sources</a:t>
+            </a:r>
+          </a:p>
+        </p:txBody>
+      </p:sp>
+    </p:spTree>
+    <p:extLst>
+      <p:ext uri="{BB962C8B-B14F-4D97-AF65-F5344CB8AC3E}">
+        <p14:creationId xmlns:p14="http://schemas.microsoft.com/office/powerpoint/2010/main" val="3404698508"/>
+      </p:ext>
+    </p:extLst>
+  </p:cSld>
+  <p:clrMapOvr>
+    <a:masterClrMapping/>
+  </p:clrMapOvr>
+</p:sld>
+</file>
+
+<file path=ppt/slides/slide6.xml><?xml version="1.0" encoding="utf-8"?>
 <p:sld xmlns:a="http://schemas.openxmlformats.org/drawingml/2006/main" xmlns:r="http://schemas.openxmlformats.org/officeDocument/2006/relationships" xmlns:p="http://schemas.openxmlformats.org/presentationml/2006/main">
   <p:cSld>
     <p:spTree>
@@ -39166,12 +39858,6 @@
         <p:txBody>
           <a:bodyPr/>
           <a:lstStyle/>
-          <a:p>
-            <a:r>
-              <a:rPr lang="en-US" dirty="0"/>
-              <a:t>Where will the next UFO sighting occur in Arizona (Month and City)?</a:t>
-            </a:r>
-          </a:p>
           <a:p>
             <a:r>
               <a:rPr lang="en-US" dirty="0"/>
@@ -39221,7 +39907,7 @@
 </p:sld>
 </file>
 
-<file path=ppt/slides/slide5.xml><?xml version="1.0" encoding="utf-8"?>
+<file path=ppt/slides/slide7.xml><?xml version="1.0" encoding="utf-8"?>
 <p:sld xmlns:a="http://schemas.openxmlformats.org/drawingml/2006/main" xmlns:r="http://schemas.openxmlformats.org/officeDocument/2006/relationships" xmlns:p="http://schemas.openxmlformats.org/presentationml/2006/main">
   <p:cSld>
     <p:spTree>
@@ -39256,7 +39942,7 @@
         </p:nvSpPr>
         <p:spPr>
           <a:xfrm>
-            <a:off x="618824" y="1070312"/>
+            <a:off x="618825" y="989475"/>
             <a:ext cx="7732219" cy="3565982"/>
           </a:xfrm>
         </p:spPr>
@@ -39266,7 +39952,7 @@
           <a:p>
             <a:r>
               <a:rPr lang="en-US" dirty="0"/>
-              <a:t>Dataset ETL: </a:t>
+              <a:t>Dataset ETL/ERD: </a:t>
             </a:r>
           </a:p>
           <a:p>
@@ -39313,7 +39999,72 @@
             </a:r>
             <a:r>
               <a:rPr lang="en-US" dirty="0"/>
-              <a:t> with () Methods</a:t>
+              <a:t> – </a:t>
+            </a:r>
+            <a:r>
+              <a:rPr lang="en-US" dirty="0" err="1"/>
+              <a:t>PySpark</a:t>
+            </a:r>
+            <a:endParaRPr lang="en-US" dirty="0"/>
+          </a:p>
+          <a:p>
+            <a:pPr lvl="1">
+              <a:spcBef>
+                <a:spcPts val="0"/>
+              </a:spcBef>
+            </a:pPr>
+            <a:r>
+              <a:rPr lang="en-US" dirty="0"/>
+              <a:t>Pandas</a:t>
+            </a:r>
+          </a:p>
+          <a:p>
+            <a:pPr lvl="1">
+              <a:spcBef>
+                <a:spcPts val="0"/>
+              </a:spcBef>
+            </a:pPr>
+            <a:r>
+              <a:rPr lang="en-US" dirty="0" err="1"/>
+              <a:t>SKLearn</a:t>
+            </a:r>
+            <a:r>
+              <a:rPr lang="en-US" dirty="0"/>
+              <a:t> Cluster</a:t>
+            </a:r>
+          </a:p>
+          <a:p>
+            <a:pPr lvl="1">
+              <a:spcBef>
+                <a:spcPts val="0"/>
+              </a:spcBef>
+            </a:pPr>
+            <a:r>
+              <a:rPr lang="en-US" dirty="0" err="1"/>
+              <a:t>Plotly</a:t>
+            </a:r>
+            <a:endParaRPr lang="en-US" dirty="0"/>
+          </a:p>
+          <a:p>
+            <a:pPr lvl="1">
+              <a:spcBef>
+                <a:spcPts val="0"/>
+              </a:spcBef>
+            </a:pPr>
+            <a:r>
+              <a:rPr lang="en-US" dirty="0"/>
+              <a:t>Matplotlib</a:t>
+            </a:r>
+          </a:p>
+          <a:p>
+            <a:pPr lvl="1">
+              <a:spcBef>
+                <a:spcPts val="0"/>
+              </a:spcBef>
+            </a:pPr>
+            <a:r>
+              <a:rPr lang="en-US" dirty="0"/>
+              <a:t>HV Plot</a:t>
             </a:r>
           </a:p>
           <a:p>
@@ -39344,12 +40095,43 @@
               </a:spcBef>
             </a:pPr>
             <a:r>
+              <a:rPr lang="en-US" dirty="0"/>
+              <a:t>SQL Alchemy: Connection String to Python</a:t>
+            </a:r>
+          </a:p>
+          <a:p>
+            <a:pPr lvl="1">
+              <a:spcBef>
+                <a:spcPts val="0"/>
+              </a:spcBef>
+            </a:pPr>
+            <a:r>
               <a:rPr lang="en-US" dirty="0" err="1"/>
               <a:t>QuickDBA</a:t>
             </a:r>
             <a:r>
               <a:rPr lang="en-US" dirty="0"/>
               <a:t>: ERD Creation</a:t>
+            </a:r>
+          </a:p>
+          <a:p>
+            <a:r>
+              <a:rPr lang="en-US" dirty="0"/>
+              <a:t>Data Visualization</a:t>
+            </a:r>
+          </a:p>
+          <a:p>
+            <a:pPr lvl="1">
+              <a:lnSpc>
+                <a:spcPct val="100000"/>
+              </a:lnSpc>
+              <a:spcBef>
+                <a:spcPts val="0"/>
+              </a:spcBef>
+            </a:pPr>
+            <a:r>
+              <a:rPr lang="en-US" dirty="0"/>
+              <a:t>Power BI</a:t>
             </a:r>
           </a:p>
         </p:txBody>
@@ -39386,6 +40168,187 @@
     <p:extLst>
       <p:ext uri="{BB962C8B-B14F-4D97-AF65-F5344CB8AC3E}">
         <p14:creationId xmlns:p14="http://schemas.microsoft.com/office/powerpoint/2010/main" val="3932817034"/>
+      </p:ext>
+    </p:extLst>
+  </p:cSld>
+  <p:clrMapOvr>
+    <a:masterClrMapping/>
+  </p:clrMapOvr>
+</p:sld>
+</file>
+
+<file path=ppt/slides/slide8.xml><?xml version="1.0" encoding="utf-8"?>
+<p:sld xmlns:a="http://schemas.openxmlformats.org/drawingml/2006/main" xmlns:r="http://schemas.openxmlformats.org/officeDocument/2006/relationships" xmlns:p="http://schemas.openxmlformats.org/presentationml/2006/main">
+  <p:cSld>
+    <p:spTree>
+      <p:nvGrpSpPr>
+        <p:cNvPr id="1" name=""/>
+        <p:cNvGrpSpPr/>
+        <p:nvPr/>
+      </p:nvGrpSpPr>
+      <p:grpSpPr>
+        <a:xfrm>
+          <a:off x="0" y="0"/>
+          <a:ext cx="0" cy="0"/>
+          <a:chOff x="0" y="0"/>
+          <a:chExt cx="0" cy="0"/>
+        </a:xfrm>
+      </p:grpSpPr>
+      <p:sp>
+        <p:nvSpPr>
+          <p:cNvPr id="2" name="Text Placeholder 1">
+            <a:extLst>
+              <a:ext uri="{FF2B5EF4-FFF2-40B4-BE49-F238E27FC236}">
+                <a16:creationId xmlns:a16="http://schemas.microsoft.com/office/drawing/2014/main" id="{6838AB74-E149-05E1-7EC6-04480757AA64}"/>
+              </a:ext>
+            </a:extLst>
+          </p:cNvPr>
+          <p:cNvSpPr>
+            <a:spLocks noGrp="1"/>
+          </p:cNvSpPr>
+          <p:nvPr>
+            <p:ph type="body" idx="1"/>
+          </p:nvPr>
+        </p:nvSpPr>
+        <p:spPr>
+          <a:xfrm>
+            <a:off x="446855" y="932325"/>
+            <a:ext cx="8089925" cy="3561093"/>
+          </a:xfrm>
+        </p:spPr>
+        <p:txBody>
+          <a:bodyPr/>
+          <a:lstStyle/>
+          <a:p>
+            <a:endParaRPr lang="en-US" dirty="0"/>
+          </a:p>
+        </p:txBody>
+      </p:sp>
+      <p:sp>
+        <p:nvSpPr>
+          <p:cNvPr id="3" name="Title 2">
+            <a:extLst>
+              <a:ext uri="{FF2B5EF4-FFF2-40B4-BE49-F238E27FC236}">
+                <a16:creationId xmlns:a16="http://schemas.microsoft.com/office/drawing/2014/main" id="{BF15AF7D-8DB2-E646-912C-C80B941C807B}"/>
+              </a:ext>
+            </a:extLst>
+          </p:cNvPr>
+          <p:cNvSpPr>
+            <a:spLocks noGrp="1"/>
+          </p:cNvSpPr>
+          <p:nvPr>
+            <p:ph type="ctrTitle"/>
+          </p:nvPr>
+        </p:nvSpPr>
+        <p:spPr>
+          <a:xfrm>
+            <a:off x="346843" y="354526"/>
+            <a:ext cx="7254107" cy="577800"/>
+          </a:xfrm>
+        </p:spPr>
+        <p:txBody>
+          <a:bodyPr/>
+          <a:lstStyle/>
+          <a:p>
+            <a:r>
+              <a:rPr lang="en-US" dirty="0"/>
+              <a:t>Exploratory Data Analysis (ERD) - Connie</a:t>
+            </a:r>
+          </a:p>
+        </p:txBody>
+      </p:sp>
+    </p:spTree>
+    <p:extLst>
+      <p:ext uri="{BB962C8B-B14F-4D97-AF65-F5344CB8AC3E}">
+        <p14:creationId xmlns:p14="http://schemas.microsoft.com/office/powerpoint/2010/main" val="3007988585"/>
+      </p:ext>
+    </p:extLst>
+  </p:cSld>
+  <p:clrMapOvr>
+    <a:masterClrMapping/>
+  </p:clrMapOvr>
+</p:sld>
+</file>
+
+<file path=ppt/slides/slide9.xml><?xml version="1.0" encoding="utf-8"?>
+<p:sld xmlns:a="http://schemas.openxmlformats.org/drawingml/2006/main" xmlns:r="http://schemas.openxmlformats.org/officeDocument/2006/relationships" xmlns:p="http://schemas.openxmlformats.org/presentationml/2006/main">
+  <p:cSld>
+    <p:spTree>
+      <p:nvGrpSpPr>
+        <p:cNvPr id="1" name=""/>
+        <p:cNvGrpSpPr/>
+        <p:nvPr/>
+      </p:nvGrpSpPr>
+      <p:grpSpPr>
+        <a:xfrm>
+          <a:off x="0" y="0"/>
+          <a:ext cx="0" cy="0"/>
+          <a:chOff x="0" y="0"/>
+          <a:chExt cx="0" cy="0"/>
+        </a:xfrm>
+      </p:grpSpPr>
+      <p:sp>
+        <p:nvSpPr>
+          <p:cNvPr id="2" name="Text Placeholder 1">
+            <a:extLst>
+              <a:ext uri="{FF2B5EF4-FFF2-40B4-BE49-F238E27FC236}">
+                <a16:creationId xmlns:a16="http://schemas.microsoft.com/office/drawing/2014/main" id="{5E80CADE-F326-3EDF-6D77-52F406320514}"/>
+              </a:ext>
+            </a:extLst>
+          </p:cNvPr>
+          <p:cNvSpPr>
+            <a:spLocks noGrp="1"/>
+          </p:cNvSpPr>
+          <p:nvPr>
+            <p:ph type="body" idx="1"/>
+          </p:nvPr>
+        </p:nvSpPr>
+        <p:spPr/>
+        <p:txBody>
+          <a:bodyPr/>
+          <a:lstStyle/>
+          <a:p>
+            <a:endParaRPr lang="en-US"/>
+          </a:p>
+        </p:txBody>
+      </p:sp>
+      <p:sp>
+        <p:nvSpPr>
+          <p:cNvPr id="3" name="Title 2">
+            <a:extLst>
+              <a:ext uri="{FF2B5EF4-FFF2-40B4-BE49-F238E27FC236}">
+                <a16:creationId xmlns:a16="http://schemas.microsoft.com/office/drawing/2014/main" id="{C27D9418-E84C-BAC2-06A7-6A289F8DC17A}"/>
+              </a:ext>
+            </a:extLst>
+          </p:cNvPr>
+          <p:cNvSpPr>
+            <a:spLocks noGrp="1"/>
+          </p:cNvSpPr>
+          <p:nvPr>
+            <p:ph type="ctrTitle"/>
+          </p:nvPr>
+        </p:nvSpPr>
+        <p:spPr>
+          <a:xfrm>
+            <a:off x="618824" y="411675"/>
+            <a:ext cx="5496225" cy="577800"/>
+          </a:xfrm>
+        </p:spPr>
+        <p:txBody>
+          <a:bodyPr/>
+          <a:lstStyle/>
+          <a:p>
+            <a:r>
+              <a:rPr lang="en-US" dirty="0"/>
+              <a:t>Machine Learning Model – Angelica</a:t>
+            </a:r>
+          </a:p>
+        </p:txBody>
+      </p:sp>
+    </p:spTree>
+    <p:extLst>
+      <p:ext uri="{BB962C8B-B14F-4D97-AF65-F5344CB8AC3E}">
+        <p14:creationId xmlns:p14="http://schemas.microsoft.com/office/powerpoint/2010/main" val="1903034872"/>
       </p:ext>
     </p:extLst>
   </p:cSld>

</xml_diff>